<commit_message>
Everyone loves git! It's great!. Normal mapping
</commit_message>
<xml_diff>
--- a/6022_Phys_2_(2025)/Day2Day/W11 (forward kinematics, quaternions)/INFO-6022-Forward kinematics, quaternions.pptx
+++ b/6022_Phys_2_(2025)/Day2Day/W11 (forward kinematics, quaternions)/INFO-6022-Forward kinematics, quaternions.pptx
@@ -10,17 +10,19 @@
     <p:sldId id="258" r:id="rId4"/>
     <p:sldId id="260" r:id="rId5"/>
     <p:sldId id="261" r:id="rId6"/>
-    <p:sldId id="262" r:id="rId7"/>
-    <p:sldId id="263" r:id="rId8"/>
-    <p:sldId id="264" r:id="rId9"/>
-    <p:sldId id="265" r:id="rId10"/>
-    <p:sldId id="266" r:id="rId11"/>
-    <p:sldId id="267" r:id="rId12"/>
-    <p:sldId id="268" r:id="rId13"/>
-    <p:sldId id="269" r:id="rId14"/>
-    <p:sldId id="270" r:id="rId15"/>
-    <p:sldId id="271" r:id="rId16"/>
-    <p:sldId id="272" r:id="rId17"/>
+    <p:sldId id="273" r:id="rId7"/>
+    <p:sldId id="274" r:id="rId8"/>
+    <p:sldId id="262" r:id="rId9"/>
+    <p:sldId id="263" r:id="rId10"/>
+    <p:sldId id="264" r:id="rId11"/>
+    <p:sldId id="265" r:id="rId12"/>
+    <p:sldId id="266" r:id="rId13"/>
+    <p:sldId id="267" r:id="rId14"/>
+    <p:sldId id="268" r:id="rId15"/>
+    <p:sldId id="269" r:id="rId16"/>
+    <p:sldId id="270" r:id="rId17"/>
+    <p:sldId id="271" r:id="rId18"/>
+    <p:sldId id="272" r:id="rId19"/>
   </p:sldIdLst>
   <p:sldSz cx="12192000" cy="6858000"/>
   <p:notesSz cx="6858000" cy="9144000"/>
@@ -119,6 +121,11 @@
       </a:defRPr>
     </a:lvl9pPr>
   </p:defaultTextStyle>
+  <p:extLst>
+    <p:ext uri="{EFAFB233-063F-42B5-8137-9DF3F51BA10A}">
+      <p15:sldGuideLst xmlns:p15="http://schemas.microsoft.com/office/powerpoint/2012/main"/>
+    </p:ext>
+  </p:extLst>
 </p:presentation>
 </file>
 
@@ -271,7 +278,7 @@
           <a:p>
             <a:fld id="{4382B9B2-B969-432D-9328-458840A6746F}" type="datetimeFigureOut">
               <a:rPr lang="en-CA" smtClean="0"/>
-              <a:t>2025-03-24</a:t>
+              <a:t>2025-03-25</a:t>
             </a:fld>
             <a:endParaRPr lang="en-CA"/>
           </a:p>
@@ -471,7 +478,7 @@
           <a:p>
             <a:fld id="{4382B9B2-B969-432D-9328-458840A6746F}" type="datetimeFigureOut">
               <a:rPr lang="en-CA" smtClean="0"/>
-              <a:t>2025-03-24</a:t>
+              <a:t>2025-03-25</a:t>
             </a:fld>
             <a:endParaRPr lang="en-CA"/>
           </a:p>
@@ -681,7 +688,7 @@
           <a:p>
             <a:fld id="{4382B9B2-B969-432D-9328-458840A6746F}" type="datetimeFigureOut">
               <a:rPr lang="en-CA" smtClean="0"/>
-              <a:t>2025-03-24</a:t>
+              <a:t>2025-03-25</a:t>
             </a:fld>
             <a:endParaRPr lang="en-CA"/>
           </a:p>
@@ -881,7 +888,7 @@
           <a:p>
             <a:fld id="{4382B9B2-B969-432D-9328-458840A6746F}" type="datetimeFigureOut">
               <a:rPr lang="en-CA" smtClean="0"/>
-              <a:t>2025-03-24</a:t>
+              <a:t>2025-03-25</a:t>
             </a:fld>
             <a:endParaRPr lang="en-CA"/>
           </a:p>
@@ -1157,7 +1164,7 @@
           <a:p>
             <a:fld id="{4382B9B2-B969-432D-9328-458840A6746F}" type="datetimeFigureOut">
               <a:rPr lang="en-CA" smtClean="0"/>
-              <a:t>2025-03-24</a:t>
+              <a:t>2025-03-25</a:t>
             </a:fld>
             <a:endParaRPr lang="en-CA"/>
           </a:p>
@@ -1425,7 +1432,7 @@
           <a:p>
             <a:fld id="{4382B9B2-B969-432D-9328-458840A6746F}" type="datetimeFigureOut">
               <a:rPr lang="en-CA" smtClean="0"/>
-              <a:t>2025-03-24</a:t>
+              <a:t>2025-03-25</a:t>
             </a:fld>
             <a:endParaRPr lang="en-CA"/>
           </a:p>
@@ -1840,7 +1847,7 @@
           <a:p>
             <a:fld id="{4382B9B2-B969-432D-9328-458840A6746F}" type="datetimeFigureOut">
               <a:rPr lang="en-CA" smtClean="0"/>
-              <a:t>2025-03-24</a:t>
+              <a:t>2025-03-25</a:t>
             </a:fld>
             <a:endParaRPr lang="en-CA"/>
           </a:p>
@@ -1982,7 +1989,7 @@
           <a:p>
             <a:fld id="{4382B9B2-B969-432D-9328-458840A6746F}" type="datetimeFigureOut">
               <a:rPr lang="en-CA" smtClean="0"/>
-              <a:t>2025-03-24</a:t>
+              <a:t>2025-03-25</a:t>
             </a:fld>
             <a:endParaRPr lang="en-CA"/>
           </a:p>
@@ -2095,7 +2102,7 @@
           <a:p>
             <a:fld id="{4382B9B2-B969-432D-9328-458840A6746F}" type="datetimeFigureOut">
               <a:rPr lang="en-CA" smtClean="0"/>
-              <a:t>2025-03-24</a:t>
+              <a:t>2025-03-25</a:t>
             </a:fld>
             <a:endParaRPr lang="en-CA"/>
           </a:p>
@@ -2408,7 +2415,7 @@
           <a:p>
             <a:fld id="{4382B9B2-B969-432D-9328-458840A6746F}" type="datetimeFigureOut">
               <a:rPr lang="en-CA" smtClean="0"/>
-              <a:t>2025-03-24</a:t>
+              <a:t>2025-03-25</a:t>
             </a:fld>
             <a:endParaRPr lang="en-CA"/>
           </a:p>
@@ -2697,7 +2704,7 @@
           <a:p>
             <a:fld id="{4382B9B2-B969-432D-9328-458840A6746F}" type="datetimeFigureOut">
               <a:rPr lang="en-CA" smtClean="0"/>
-              <a:t>2025-03-24</a:t>
+              <a:t>2025-03-25</a:t>
             </a:fld>
             <a:endParaRPr lang="en-CA"/>
           </a:p>
@@ -2940,7 +2947,7 @@
           <a:p>
             <a:fld id="{4382B9B2-B969-432D-9328-458840A6746F}" type="datetimeFigureOut">
               <a:rPr lang="en-CA" smtClean="0"/>
-              <a:t>2025-03-24</a:t>
+              <a:t>2025-03-25</a:t>
             </a:fld>
             <a:endParaRPr lang="en-CA"/>
           </a:p>
@@ -3508,165 +3515,84 @@
           <a:lstStyle/>
           <a:p>
             <a:r>
-              <a:rPr lang="en-CA" b="1" dirty="0" err="1"/>
-              <a:t>matAdjustmentXYZ</a:t>
-            </a:r>
-            <a:r>
-              <a:rPr lang="en-CA" dirty="0"/>
-              <a:t> = </a:t>
-            </a:r>
-            <a:r>
-              <a:rPr lang="en-CA" i="1" u="sng" dirty="0"/>
-              <a:t>translate( vec3( 0, +0.1, 0 ) );</a:t>
-            </a:r>
-          </a:p>
-          <a:p>
+              <a:rPr lang="en-CA" dirty="0"/>
+              <a:t>Now consider you are moving it “a little bit”</a:t>
+            </a:r>
+          </a:p>
+          <a:p>
+            <a:r>
+              <a:rPr lang="en-CA" dirty="0"/>
+              <a:t>Press a key and it moves (0, +0.1, 0) </a:t>
+            </a:r>
+          </a:p>
+          <a:p>
+            <a:pPr lvl="1"/>
+            <a:r>
+              <a:rPr lang="en-CA" dirty="0"/>
+              <a:t>(+0.1 units in the y)</a:t>
+            </a:r>
+          </a:p>
+          <a:p>
+            <a:pPr lvl="1"/>
+            <a:r>
+              <a:rPr lang="en-CA" dirty="0"/>
+              <a:t>vec3 </a:t>
+            </a:r>
+            <a:r>
+              <a:rPr lang="en-CA" dirty="0" err="1"/>
+              <a:t>adjustmentXYZ</a:t>
+            </a:r>
+            <a:r>
+              <a:rPr lang="en-CA" dirty="0"/>
+              <a:t> = vec3(0, +0.1, 0)</a:t>
+            </a:r>
+          </a:p>
+          <a:p>
+            <a:r>
+              <a:rPr lang="en-CA" dirty="0"/>
+              <a:t>If you are storing position, you would add this to the current position:</a:t>
+            </a:r>
+          </a:p>
+          <a:p>
+            <a:pPr lvl="1"/>
+            <a:r>
+              <a:rPr lang="en-CA" dirty="0" err="1"/>
+              <a:t>PositionXYZ</a:t>
+            </a:r>
+            <a:r>
+              <a:rPr lang="en-CA" dirty="0"/>
+              <a:t> += </a:t>
+            </a:r>
+            <a:r>
+              <a:rPr lang="en-CA" dirty="0" err="1"/>
+              <a:t>adjustmentXYZ</a:t>
+            </a:r>
+            <a:endParaRPr lang="en-CA" dirty="0"/>
+          </a:p>
+          <a:p>
+            <a:pPr lvl="1"/>
+            <a:r>
+              <a:rPr lang="en-CA" dirty="0"/>
+              <a:t>Then use current position to calculate a model matrix</a:t>
+            </a:r>
+          </a:p>
+          <a:p>
+            <a:pPr lvl="1"/>
             <a:r>
               <a:rPr lang="en-CA" dirty="0" err="1"/>
               <a:t>matModel</a:t>
             </a:r>
             <a:r>
               <a:rPr lang="en-CA" dirty="0"/>
-              <a:t> = mat4(1.0f);		// At the origin (0,0,0)</a:t>
-            </a:r>
-          </a:p>
-          <a:p>
-            <a:r>
-              <a:rPr lang="en-CA" dirty="0" err="1"/>
-              <a:t>matModel</a:t>
-            </a:r>
-            <a:r>
-              <a:rPr lang="en-CA" dirty="0"/>
-              <a:t> *= </a:t>
-            </a:r>
-            <a:r>
-              <a:rPr lang="en-CA" b="1" dirty="0" err="1"/>
-              <a:t>matAdjustmentXYZ</a:t>
-            </a:r>
-            <a:r>
-              <a:rPr lang="en-CA" b="1" dirty="0"/>
-              <a:t>   </a:t>
-            </a:r>
-            <a:r>
-              <a:rPr lang="en-CA" dirty="0">
-                <a:sym typeface="Wingdings" panose="05000000000000000000" pitchFamily="2" charset="2"/>
-              </a:rPr>
-              <a:t> now at 0, 0.1, 0</a:t>
-            </a:r>
-          </a:p>
-          <a:p>
-            <a:r>
-              <a:rPr lang="en-CA" dirty="0" err="1"/>
-              <a:t>matModel</a:t>
-            </a:r>
-            <a:r>
-              <a:rPr lang="en-CA" dirty="0"/>
-              <a:t> *= </a:t>
-            </a:r>
-            <a:r>
-              <a:rPr lang="en-CA" b="1" dirty="0" err="1"/>
-              <a:t>matAdjustmentXYZ</a:t>
-            </a:r>
-            <a:r>
-              <a:rPr lang="en-CA" b="1" dirty="0"/>
-              <a:t>   </a:t>
-            </a:r>
-            <a:r>
-              <a:rPr lang="en-CA" dirty="0">
-                <a:sym typeface="Wingdings" panose="05000000000000000000" pitchFamily="2" charset="2"/>
-              </a:rPr>
-              <a:t> now at 0, 0.2, 0</a:t>
-            </a:r>
-          </a:p>
-          <a:p>
-            <a:r>
-              <a:rPr lang="en-CA" dirty="0" err="1"/>
-              <a:t>matModel</a:t>
-            </a:r>
-            <a:r>
-              <a:rPr lang="en-CA" dirty="0"/>
-              <a:t> *= </a:t>
-            </a:r>
-            <a:r>
-              <a:rPr lang="en-CA" b="1" dirty="0" err="1"/>
-              <a:t>matAdjustmentXYZ</a:t>
-            </a:r>
-            <a:r>
-              <a:rPr lang="en-CA" b="1" dirty="0"/>
-              <a:t>   </a:t>
-            </a:r>
-            <a:r>
-              <a:rPr lang="en-CA" dirty="0">
-                <a:sym typeface="Wingdings" panose="05000000000000000000" pitchFamily="2" charset="2"/>
-              </a:rPr>
-              <a:t> now at 0, 0.3, 0</a:t>
-            </a:r>
-          </a:p>
-          <a:p>
-            <a:r>
-              <a:rPr lang="en-CA" dirty="0" err="1"/>
-              <a:t>matModel</a:t>
-            </a:r>
-            <a:r>
-              <a:rPr lang="en-CA" dirty="0"/>
-              <a:t> *= </a:t>
-            </a:r>
-            <a:r>
-              <a:rPr lang="en-CA" b="1" dirty="0" err="1"/>
-              <a:t>matAdjustmentXYZ</a:t>
-            </a:r>
-            <a:r>
-              <a:rPr lang="en-CA" b="1" dirty="0"/>
-              <a:t>   </a:t>
-            </a:r>
-            <a:r>
-              <a:rPr lang="en-CA" dirty="0">
-                <a:sym typeface="Wingdings" panose="05000000000000000000" pitchFamily="2" charset="2"/>
-              </a:rPr>
-              <a:t> now at 0, 0.4, 0</a:t>
-            </a:r>
-            <a:endParaRPr lang="en-CA" dirty="0"/>
-          </a:p>
-          <a:p>
-            <a:r>
-              <a:rPr lang="en-CA" dirty="0" err="1"/>
-              <a:t>matModel</a:t>
-            </a:r>
-            <a:r>
-              <a:rPr lang="en-CA" dirty="0"/>
-              <a:t> *= </a:t>
-            </a:r>
-            <a:r>
-              <a:rPr lang="en-CA" b="1" dirty="0" err="1"/>
-              <a:t>matAdjustmentXYZ</a:t>
-            </a:r>
-            <a:r>
-              <a:rPr lang="en-CA" b="1" dirty="0"/>
-              <a:t>   </a:t>
-            </a:r>
-            <a:r>
-              <a:rPr lang="en-CA" dirty="0">
-                <a:sym typeface="Wingdings" panose="05000000000000000000" pitchFamily="2" charset="2"/>
-              </a:rPr>
-              <a:t> now at 0, 0.5, 0</a:t>
-            </a:r>
-            <a:endParaRPr lang="en-CA" dirty="0"/>
-          </a:p>
-          <a:p>
-            <a:endParaRPr lang="en-CA" dirty="0"/>
-          </a:p>
-          <a:p>
-            <a:endParaRPr lang="en-CA" dirty="0"/>
-          </a:p>
-          <a:p>
-            <a:endParaRPr lang="en-CA" dirty="0"/>
+              <a:t> = translate( Position)</a:t>
+            </a:r>
           </a:p>
         </p:txBody>
       </p:sp>
     </p:spTree>
     <p:extLst>
       <p:ext uri="{BB962C8B-B14F-4D97-AF65-F5344CB8AC3E}">
-        <p14:creationId xmlns:p14="http://schemas.microsoft.com/office/powerpoint/2010/main" val="417476705"/>
+        <p14:creationId xmlns:p14="http://schemas.microsoft.com/office/powerpoint/2010/main" val="376123823"/>
       </p:ext>
     </p:extLst>
   </p:cSld>
@@ -3723,7 +3649,7 @@
           <a:p>
             <a:r>
               <a:rPr lang="en-CA" sz="3600" dirty="0"/>
-              <a:t>Quaternions are handled the same way</a:t>
+              <a:t>Hypothetical using mat4 instead of translation</a:t>
             </a:r>
           </a:p>
         </p:txBody>
@@ -3746,7 +3672,7 @@
         </p:nvSpPr>
         <p:spPr>
           <a:xfrm>
-            <a:off x="653143" y="1669371"/>
+            <a:off x="566057" y="1690688"/>
             <a:ext cx="11136086" cy="4351338"/>
           </a:xfrm>
         </p:spPr>
@@ -3756,115 +3682,101 @@
           <a:p>
             <a:r>
               <a:rPr lang="en-CA" dirty="0"/>
-              <a:t>You don’t store the Euler angles</a:t>
+              <a:t>Now consider you are moving it “a little bit”</a:t>
+            </a:r>
+          </a:p>
+          <a:p>
+            <a:r>
+              <a:rPr lang="en-CA" dirty="0"/>
+              <a:t>Press a key and it moves (0, +0.1, 0) </a:t>
             </a:r>
           </a:p>
           <a:p>
             <a:pPr lvl="1"/>
             <a:r>
               <a:rPr lang="en-CA" dirty="0"/>
-              <a:t>Vec3 </a:t>
-            </a:r>
+              <a:t>(+0.1 units in the y)</a:t>
+            </a:r>
+          </a:p>
+          <a:p>
+            <a:pPr lvl="1"/>
+            <a:r>
+              <a:rPr lang="en-CA" strike="dblStrike" dirty="0"/>
+              <a:t>vec3 </a:t>
+            </a:r>
+            <a:r>
+              <a:rPr lang="en-CA" strike="dblStrike" dirty="0" err="1"/>
+              <a:t>adjustmentXYZ</a:t>
+            </a:r>
+            <a:r>
+              <a:rPr lang="en-CA" strike="dblStrike" dirty="0"/>
+              <a:t> = vec3(0, +0.1, 0)</a:t>
+            </a:r>
+          </a:p>
+          <a:p>
+            <a:pPr lvl="1"/>
+            <a:r>
+              <a:rPr lang="en-CA" b="1" dirty="0" err="1"/>
+              <a:t>matAdjustmentXYZ</a:t>
+            </a:r>
+            <a:r>
+              <a:rPr lang="en-CA" dirty="0"/>
+              <a:t> = translate( vec3( 0, +0.1, 0 ) );</a:t>
+            </a:r>
+          </a:p>
+          <a:p>
+            <a:r>
+              <a:rPr lang="en-CA" dirty="0"/>
+              <a:t>Instead of adjusting the vec3 position:</a:t>
+            </a:r>
+          </a:p>
+          <a:p>
+            <a:pPr lvl="1"/>
+            <a:r>
+              <a:rPr lang="en-CA" strike="dblStrike" dirty="0" err="1"/>
+              <a:t>PositionXYZ</a:t>
+            </a:r>
+            <a:r>
+              <a:rPr lang="en-CA" strike="dblStrike" dirty="0"/>
+              <a:t> += </a:t>
+            </a:r>
+            <a:r>
+              <a:rPr lang="en-CA" strike="dblStrike" dirty="0" err="1"/>
+              <a:t>adjustmentXYZ</a:t>
+            </a:r>
+            <a:endParaRPr lang="en-CA" strike="dblStrike" dirty="0"/>
+          </a:p>
+          <a:p>
+            <a:pPr lvl="1"/>
+            <a:r>
+              <a:rPr lang="en-CA" strike="dblStrike" dirty="0" err="1"/>
+              <a:t>matModel</a:t>
+            </a:r>
+            <a:r>
+              <a:rPr lang="en-CA" strike="dblStrike" dirty="0"/>
+              <a:t> = translate( Position)</a:t>
+            </a:r>
+          </a:p>
+          <a:p>
+            <a:r>
+              <a:rPr lang="en-CA" dirty="0"/>
+              <a:t>You apply this directly to the model matrix:</a:t>
+            </a:r>
+          </a:p>
+          <a:p>
+            <a:pPr lvl="1"/>
             <a:r>
               <a:rPr lang="en-CA" dirty="0" err="1"/>
-              <a:t>myRotation</a:t>
-            </a:r>
-            <a:r>
-              <a:rPr lang="en-CA" dirty="0"/>
-              <a:t> = vec3( </a:t>
-            </a:r>
-            <a:r>
-              <a:rPr lang="en-CA" dirty="0" err="1"/>
-              <a:t>rX</a:t>
-            </a:r>
-            <a:r>
-              <a:rPr lang="en-CA" dirty="0"/>
-              <a:t>, </a:t>
-            </a:r>
-            <a:r>
-              <a:rPr lang="en-CA" dirty="0" err="1"/>
-              <a:t>rY</a:t>
-            </a:r>
-            <a:r>
-              <a:rPr lang="en-CA" dirty="0"/>
-              <a:t>, </a:t>
-            </a:r>
-            <a:r>
-              <a:rPr lang="en-CA" dirty="0" err="1"/>
-              <a:t>rZ</a:t>
-            </a:r>
-            <a:r>
-              <a:rPr lang="en-CA" dirty="0"/>
-              <a:t> )</a:t>
-            </a:r>
-          </a:p>
-          <a:p>
-            <a:r>
-              <a:rPr lang="en-CA" dirty="0"/>
-              <a:t>You create a quaternion (just like with the matrix)</a:t>
-            </a:r>
-          </a:p>
-          <a:p>
-            <a:r>
-              <a:rPr lang="en-CA" dirty="0" err="1"/>
-              <a:t>glm</a:t>
-            </a:r>
-            <a:r>
-              <a:rPr lang="en-CA" dirty="0"/>
-              <a:t>::quat qRotation45Y = </a:t>
-            </a:r>
-            <a:r>
-              <a:rPr lang="en-CA" dirty="0" err="1"/>
-              <a:t>glm</a:t>
-            </a:r>
-            <a:r>
-              <a:rPr lang="en-CA" dirty="0"/>
-              <a:t>::quat( </a:t>
-            </a:r>
-            <a:r>
-              <a:rPr lang="en-CA" i="1" u="sng" dirty="0"/>
-              <a:t>vec3( 0.0, 45.0, 0.0 )</a:t>
-            </a:r>
-            <a:r>
-              <a:rPr lang="en-CA" i="1" dirty="0"/>
-              <a:t> </a:t>
-            </a:r>
-            <a:r>
-              <a:rPr lang="en-CA" dirty="0"/>
-              <a:t>)</a:t>
-            </a:r>
-          </a:p>
-          <a:p>
-            <a:r>
-              <a:rPr lang="en-CA" dirty="0"/>
-              <a:t>Just like the matrix, you don’t mess around with the values </a:t>
-            </a:r>
-            <a:r>
-              <a:rPr lang="en-CA" i="1" dirty="0"/>
-              <a:t>inside </a:t>
-            </a:r>
-            <a:r>
-              <a:rPr lang="en-CA" dirty="0"/>
-              <a:t>the matrix </a:t>
-            </a:r>
-            <a:r>
-              <a:rPr lang="en-CA" i="1" dirty="0"/>
-              <a:t>directly</a:t>
-            </a:r>
-            <a:r>
-              <a:rPr lang="en-CA" dirty="0"/>
-              <a:t>. Instead you apply (i.e. multiply) </a:t>
-            </a:r>
-            <a:r>
-              <a:rPr lang="en-CA" i="1" dirty="0"/>
-              <a:t>another </a:t>
-            </a:r>
-            <a:r>
-              <a:rPr lang="en-CA" dirty="0"/>
-              <a:t>matrix that updates or adjust</a:t>
-            </a:r>
-          </a:p>
-          <a:p>
+              <a:t>matModel</a:t>
+            </a:r>
+            <a:r>
+              <a:rPr lang="en-CA" dirty="0"/>
+              <a:t> *= </a:t>
+            </a:r>
+            <a:r>
+              <a:rPr lang="en-CA" b="1" dirty="0" err="1"/>
+              <a:t>matAdjustmentXYZ</a:t>
+            </a:r>
             <a:endParaRPr lang="en-CA" dirty="0"/>
           </a:p>
         </p:txBody>
@@ -3872,7 +3784,7 @@
     </p:spTree>
     <p:extLst>
       <p:ext uri="{BB962C8B-B14F-4D97-AF65-F5344CB8AC3E}">
-        <p14:creationId xmlns:p14="http://schemas.microsoft.com/office/powerpoint/2010/main" val="262571582"/>
+        <p14:creationId xmlns:p14="http://schemas.microsoft.com/office/powerpoint/2010/main" val="4033566807"/>
       </p:ext>
     </p:extLst>
   </p:cSld>
@@ -3929,7 +3841,7 @@
           <a:p>
             <a:r>
               <a:rPr lang="en-CA" sz="3600" dirty="0"/>
-              <a:t>Quaternions are handled the same way</a:t>
+              <a:t>Hypothetical using mat4 instead of translation</a:t>
             </a:r>
           </a:p>
         </p:txBody>
@@ -3952,7 +3864,7 @@
         </p:nvSpPr>
         <p:spPr>
           <a:xfrm>
-            <a:off x="653143" y="1669371"/>
+            <a:off x="566057" y="1690688"/>
             <a:ext cx="11136086" cy="4351338"/>
           </a:xfrm>
         </p:spPr>
@@ -3961,86 +3873,129 @@
           <a:lstStyle/>
           <a:p>
             <a:r>
-              <a:rPr lang="en-CA" dirty="0"/>
-              <a:t>Like matrices, there is a type of “identity” quaternion</a:t>
+              <a:rPr lang="en-CA" b="1" dirty="0" err="1"/>
+              <a:t>matAdjustmentXYZ</a:t>
+            </a:r>
+            <a:r>
+              <a:rPr lang="en-CA" dirty="0"/>
+              <a:t> = </a:t>
+            </a:r>
+            <a:r>
+              <a:rPr lang="en-CA" i="1" u="sng" dirty="0"/>
+              <a:t>translate( vec3( 0, +0.1, 0 ) );</a:t>
             </a:r>
           </a:p>
           <a:p>
             <a:r>
               <a:rPr lang="en-CA" dirty="0" err="1"/>
-              <a:t>glm</a:t>
-            </a:r>
-            <a:r>
-              <a:rPr lang="en-CA" dirty="0"/>
-              <a:t>::quat </a:t>
-            </a:r>
+              <a:t>matModel</a:t>
+            </a:r>
+            <a:r>
+              <a:rPr lang="en-CA" dirty="0"/>
+              <a:t> = mat4(1.0f);		// At the origin (0,0,0)</a:t>
+            </a:r>
+          </a:p>
+          <a:p>
             <a:r>
               <a:rPr lang="en-CA" dirty="0" err="1"/>
-              <a:t>qOrientation</a:t>
-            </a:r>
-            <a:r>
-              <a:rPr lang="en-CA" dirty="0"/>
-              <a:t> = </a:t>
-            </a:r>
+              <a:t>matModel</a:t>
+            </a:r>
+            <a:r>
+              <a:rPr lang="en-CA" dirty="0"/>
+              <a:t> *= </a:t>
+            </a:r>
+            <a:r>
+              <a:rPr lang="en-CA" b="1" dirty="0" err="1"/>
+              <a:t>matAdjustmentXYZ</a:t>
+            </a:r>
+            <a:r>
+              <a:rPr lang="en-CA" b="1" dirty="0"/>
+              <a:t>   </a:t>
+            </a:r>
+            <a:r>
+              <a:rPr lang="en-CA" dirty="0">
+                <a:sym typeface="Wingdings" panose="05000000000000000000" pitchFamily="2" charset="2"/>
+              </a:rPr>
+              <a:t> now at 0, 0.1, 0</a:t>
+            </a:r>
+          </a:p>
+          <a:p>
             <a:r>
               <a:rPr lang="en-CA" dirty="0" err="1"/>
-              <a:t>glm</a:t>
-            </a:r>
-            <a:r>
-              <a:rPr lang="en-CA" dirty="0"/>
-              <a:t>::quat(1.0f)</a:t>
-            </a:r>
-          </a:p>
-          <a:p>
-            <a:r>
-              <a:rPr lang="en-CA" dirty="0"/>
-              <a:t>Adjust this, say -37 degrees in the z:</a:t>
+              <a:t>matModel</a:t>
+            </a:r>
+            <a:r>
+              <a:rPr lang="en-CA" dirty="0"/>
+              <a:t> *= </a:t>
+            </a:r>
+            <a:r>
+              <a:rPr lang="en-CA" b="1" dirty="0" err="1"/>
+              <a:t>matAdjustmentXYZ</a:t>
+            </a:r>
+            <a:r>
+              <a:rPr lang="en-CA" b="1" dirty="0"/>
+              <a:t>   </a:t>
+            </a:r>
+            <a:r>
+              <a:rPr lang="en-CA" dirty="0">
+                <a:sym typeface="Wingdings" panose="05000000000000000000" pitchFamily="2" charset="2"/>
+              </a:rPr>
+              <a:t> now at 0, 0.2, 0</a:t>
             </a:r>
           </a:p>
           <a:p>
             <a:r>
               <a:rPr lang="en-CA" dirty="0" err="1"/>
-              <a:t>glm</a:t>
-            </a:r>
-            <a:r>
-              <a:rPr lang="en-CA" dirty="0"/>
-              <a:t>::quat </a:t>
+              <a:t>matModel</a:t>
+            </a:r>
+            <a:r>
+              <a:rPr lang="en-CA" dirty="0"/>
+              <a:t> *= </a:t>
             </a:r>
             <a:r>
               <a:rPr lang="en-CA" b="1" dirty="0" err="1"/>
-              <a:t>qAdjustment</a:t>
-            </a:r>
-            <a:r>
-              <a:rPr lang="en-CA" dirty="0"/>
-              <a:t> = </a:t>
-            </a:r>
+              <a:t>matAdjustmentXYZ</a:t>
+            </a:r>
+            <a:r>
+              <a:rPr lang="en-CA" b="1" dirty="0"/>
+              <a:t>   </a:t>
+            </a:r>
+            <a:r>
+              <a:rPr lang="en-CA" dirty="0">
+                <a:sym typeface="Wingdings" panose="05000000000000000000" pitchFamily="2" charset="2"/>
+              </a:rPr>
+              <a:t> now at 0, 0.3, 0</a:t>
+            </a:r>
+          </a:p>
+          <a:p>
             <a:r>
               <a:rPr lang="en-CA" dirty="0" err="1"/>
-              <a:t>glm</a:t>
-            </a:r>
-            <a:r>
-              <a:rPr lang="en-CA" dirty="0"/>
-              <a:t>::quat( </a:t>
+              <a:t>matModel</a:t>
+            </a:r>
+            <a:r>
+              <a:rPr lang="en-CA" dirty="0"/>
+              <a:t> *= </a:t>
+            </a:r>
+            <a:r>
+              <a:rPr lang="en-CA" b="1" dirty="0" err="1"/>
+              <a:t>matAdjustmentXYZ</a:t>
             </a:r>
             <a:r>
               <a:rPr lang="en-CA" b="1" dirty="0"/>
-              <a:t>vec3(0.0, 0.0, -37.0f</a:t>
-            </a:r>
-            <a:r>
-              <a:rPr lang="en-CA" dirty="0"/>
-              <a:t>) );</a:t>
-            </a:r>
-          </a:p>
-          <a:p>
-            <a:r>
-              <a:rPr lang="en-CA" dirty="0"/>
-              <a:t>Updating the quaternion through multiplication:</a:t>
-            </a:r>
+              <a:t>   </a:t>
+            </a:r>
+            <a:r>
+              <a:rPr lang="en-CA" dirty="0">
+                <a:sym typeface="Wingdings" panose="05000000000000000000" pitchFamily="2" charset="2"/>
+              </a:rPr>
+              <a:t> now at 0, 0.4, 0</a:t>
+            </a:r>
+            <a:endParaRPr lang="en-CA" dirty="0"/>
           </a:p>
           <a:p>
             <a:r>
               <a:rPr lang="en-CA" dirty="0" err="1"/>
-              <a:t>qOrientation</a:t>
+              <a:t>matModel</a:t>
             </a:r>
             <a:r>
               <a:rPr lang="en-CA" dirty="0"/>
@@ -4048,8 +4003,24 @@
             </a:r>
             <a:r>
               <a:rPr lang="en-CA" b="1" dirty="0" err="1"/>
-              <a:t>qAdjustment</a:t>
-            </a:r>
+              <a:t>matAdjustmentXYZ</a:t>
+            </a:r>
+            <a:r>
+              <a:rPr lang="en-CA" b="1" dirty="0"/>
+              <a:t>   </a:t>
+            </a:r>
+            <a:r>
+              <a:rPr lang="en-CA" dirty="0">
+                <a:sym typeface="Wingdings" panose="05000000000000000000" pitchFamily="2" charset="2"/>
+              </a:rPr>
+              <a:t> now at 0, 0.5, 0</a:t>
+            </a:r>
+            <a:endParaRPr lang="en-CA" dirty="0"/>
+          </a:p>
+          <a:p>
+            <a:endParaRPr lang="en-CA" dirty="0"/>
+          </a:p>
+          <a:p>
             <a:endParaRPr lang="en-CA" dirty="0"/>
           </a:p>
           <a:p>
@@ -4060,7 +4031,7 @@
     </p:spTree>
     <p:extLst>
       <p:ext uri="{BB962C8B-B14F-4D97-AF65-F5344CB8AC3E}">
-        <p14:creationId xmlns:p14="http://schemas.microsoft.com/office/powerpoint/2010/main" val="307279726"/>
+        <p14:creationId xmlns:p14="http://schemas.microsoft.com/office/powerpoint/2010/main" val="417476705"/>
       </p:ext>
     </p:extLst>
   </p:cSld>
@@ -4149,20 +4120,63 @@
           <a:lstStyle/>
           <a:p>
             <a:r>
+              <a:rPr lang="en-CA" dirty="0"/>
+              <a:t>You don’t store the Euler angles</a:t>
+            </a:r>
+          </a:p>
+          <a:p>
+            <a:pPr lvl="1"/>
+            <a:r>
+              <a:rPr lang="en-CA" dirty="0"/>
+              <a:t>Vec3 </a:t>
+            </a:r>
+            <a:r>
+              <a:rPr lang="en-CA" dirty="0" err="1"/>
+              <a:t>myRotation</a:t>
+            </a:r>
+            <a:r>
+              <a:rPr lang="en-CA" dirty="0"/>
+              <a:t> = vec3( </a:t>
+            </a:r>
+            <a:r>
+              <a:rPr lang="en-CA" dirty="0" err="1"/>
+              <a:t>rX</a:t>
+            </a:r>
+            <a:r>
+              <a:rPr lang="en-CA" dirty="0"/>
+              <a:t>, </a:t>
+            </a:r>
+            <a:r>
+              <a:rPr lang="en-CA" dirty="0" err="1"/>
+              <a:t>rY</a:t>
+            </a:r>
+            <a:r>
+              <a:rPr lang="en-CA" dirty="0"/>
+              <a:t>, </a:t>
+            </a:r>
+            <a:r>
+              <a:rPr lang="en-CA" dirty="0" err="1"/>
+              <a:t>rZ</a:t>
+            </a:r>
+            <a:r>
+              <a:rPr lang="en-CA" dirty="0"/>
+              <a:t> )</a:t>
+            </a:r>
+          </a:p>
+          <a:p>
+            <a:r>
+              <a:rPr lang="en-CA" dirty="0"/>
+              <a:t>You create a quaternion (just like with the matrix)</a:t>
+            </a:r>
+          </a:p>
+          <a:p>
+            <a:r>
               <a:rPr lang="en-CA" dirty="0" err="1"/>
               <a:t>glm</a:t>
             </a:r>
             <a:r>
               <a:rPr lang="en-CA" dirty="0"/>
-              <a:t>::quat </a:t>
-            </a:r>
-            <a:r>
-              <a:rPr lang="en-CA" dirty="0" err="1"/>
-              <a:t>qOrientation</a:t>
-            </a:r>
-            <a:r>
-              <a:rPr lang="en-CA" dirty="0"/>
-              <a:t> = </a:t>
+              <a:t>::quat qRotation45Y = </a:t>
             </a:r>
             <a:r>
               <a:rPr lang="en-CA" dirty="0" err="1"/>
@@ -4170,133 +4184,50 @@
             </a:r>
             <a:r>
               <a:rPr lang="en-CA" dirty="0"/>
-              <a:t>::quat(1.0f)		// Euler 0, 0, 0</a:t>
-            </a:r>
-          </a:p>
-          <a:p>
-            <a:r>
-              <a:rPr lang="en-CA" dirty="0"/>
-              <a:t>Adjust this, say -1 degrees in the z:</a:t>
-            </a:r>
-          </a:p>
-          <a:p>
-            <a:r>
-              <a:rPr lang="en-CA" dirty="0" err="1"/>
-              <a:t>glm</a:t>
-            </a:r>
-            <a:r>
-              <a:rPr lang="en-CA" dirty="0"/>
-              <a:t>::quat </a:t>
-            </a:r>
-            <a:r>
-              <a:rPr lang="en-CA" b="1" dirty="0" err="1"/>
-              <a:t>qAdjustment</a:t>
-            </a:r>
-            <a:r>
-              <a:rPr lang="en-CA" dirty="0"/>
-              <a:t> = </a:t>
-            </a:r>
-            <a:r>
-              <a:rPr lang="en-CA" dirty="0" err="1"/>
-              <a:t>glm</a:t>
-            </a:r>
-            <a:r>
-              <a:rPr lang="en-CA" dirty="0"/>
-              <a:t>::quat( vec3(</a:t>
-            </a:r>
-            <a:r>
-              <a:rPr lang="en-CA" b="1" dirty="0"/>
-              <a:t>0.0, 0.0, -1.0f</a:t>
-            </a:r>
-            <a:r>
-              <a:rPr lang="en-CA" dirty="0"/>
-              <a:t>) );</a:t>
-            </a:r>
-          </a:p>
-          <a:p>
-            <a:r>
-              <a:rPr lang="en-CA" dirty="0"/>
-              <a:t>Updating the quaternion through multiplication:</a:t>
-            </a:r>
-          </a:p>
-          <a:p>
-            <a:r>
-              <a:rPr lang="en-CA" dirty="0" err="1"/>
-              <a:t>qOrientation</a:t>
-            </a:r>
-            <a:r>
-              <a:rPr lang="en-CA" dirty="0"/>
-              <a:t> *= </a:t>
-            </a:r>
-            <a:r>
-              <a:rPr lang="en-CA" b="1" dirty="0" err="1"/>
-              <a:t>qAdjustment</a:t>
-            </a:r>
-            <a:r>
-              <a:rPr lang="en-CA" dirty="0"/>
-              <a:t>	</a:t>
-            </a:r>
-            <a:r>
-              <a:rPr lang="en-CA" dirty="0">
-                <a:sym typeface="Wingdings" panose="05000000000000000000" pitchFamily="2" charset="2"/>
-              </a:rPr>
-              <a:t> -1 degrees around z</a:t>
-            </a:r>
-          </a:p>
-          <a:p>
-            <a:r>
-              <a:rPr lang="en-CA" dirty="0" err="1"/>
-              <a:t>qOrientation</a:t>
-            </a:r>
-            <a:r>
-              <a:rPr lang="en-CA" dirty="0"/>
-              <a:t> *= </a:t>
-            </a:r>
-            <a:r>
-              <a:rPr lang="en-CA" b="1" dirty="0" err="1"/>
-              <a:t>qAdjustment</a:t>
-            </a:r>
-            <a:r>
-              <a:rPr lang="en-CA" dirty="0"/>
-              <a:t>	</a:t>
-            </a:r>
-            <a:r>
-              <a:rPr lang="en-CA" dirty="0">
-                <a:sym typeface="Wingdings" panose="05000000000000000000" pitchFamily="2" charset="2"/>
-              </a:rPr>
-              <a:t> -2 degrees around z</a:t>
-            </a:r>
-          </a:p>
-          <a:p>
-            <a:r>
-              <a:rPr lang="en-CA" dirty="0" err="1"/>
-              <a:t>qOrientation</a:t>
-            </a:r>
-            <a:r>
-              <a:rPr lang="en-CA" dirty="0"/>
-              <a:t> *= </a:t>
-            </a:r>
-            <a:r>
-              <a:rPr lang="en-CA" b="1" dirty="0" err="1"/>
-              <a:t>qAdjustment</a:t>
-            </a:r>
-            <a:r>
-              <a:rPr lang="en-CA" dirty="0"/>
-              <a:t>	</a:t>
-            </a:r>
-            <a:r>
-              <a:rPr lang="en-CA" dirty="0">
-                <a:sym typeface="Wingdings" panose="05000000000000000000" pitchFamily="2" charset="2"/>
-              </a:rPr>
-              <a:t> -3 degrees around z</a:t>
-            </a:r>
-            <a:endParaRPr lang="en-CA" dirty="0"/>
-          </a:p>
-          <a:p>
-            <a:endParaRPr lang="en-CA" dirty="0"/>
-          </a:p>
-          <a:p>
-            <a:endParaRPr lang="en-CA" dirty="0"/>
+              <a:t>::quat( </a:t>
+            </a:r>
+            <a:r>
+              <a:rPr lang="en-CA" i="1" u="sng" dirty="0"/>
+              <a:t>vec3( 0.0, 45.0, 0.0 )</a:t>
+            </a:r>
+            <a:r>
+              <a:rPr lang="en-CA" i="1" dirty="0"/>
+              <a:t> </a:t>
+            </a:r>
+            <a:r>
+              <a:rPr lang="en-CA" dirty="0"/>
+              <a:t>)</a:t>
+            </a:r>
+          </a:p>
+          <a:p>
+            <a:r>
+              <a:rPr lang="en-CA" dirty="0"/>
+              <a:t>Just like the matrix, you don’t mess around with the values </a:t>
+            </a:r>
+            <a:r>
+              <a:rPr lang="en-CA" i="1" dirty="0"/>
+              <a:t>inside </a:t>
+            </a:r>
+            <a:r>
+              <a:rPr lang="en-CA" dirty="0"/>
+              <a:t>the matrix </a:t>
+            </a:r>
+            <a:r>
+              <a:rPr lang="en-CA" i="1" dirty="0"/>
+              <a:t>directly</a:t>
+            </a:r>
+            <a:r>
+              <a:rPr lang="en-CA" dirty="0"/>
+              <a:t>. Instead you apply (i.e. multiply) </a:t>
+            </a:r>
+            <a:r>
+              <a:rPr lang="en-CA" i="1" dirty="0"/>
+              <a:t>another </a:t>
+            </a:r>
+            <a:r>
+              <a:rPr lang="en-CA" dirty="0"/>
+              <a:t>matrix that updates or adjust</a:t>
+            </a:r>
           </a:p>
           <a:p>
             <a:endParaRPr lang="en-CA" dirty="0"/>
@@ -4306,7 +4237,7 @@
     </p:spTree>
     <p:extLst>
       <p:ext uri="{BB962C8B-B14F-4D97-AF65-F5344CB8AC3E}">
-        <p14:creationId xmlns:p14="http://schemas.microsoft.com/office/powerpoint/2010/main" val="2642662493"/>
+        <p14:creationId xmlns:p14="http://schemas.microsoft.com/office/powerpoint/2010/main" val="262571582"/>
       </p:ext>
     </p:extLst>
   </p:cSld>
@@ -4363,6 +4294,440 @@
           <a:p>
             <a:r>
               <a:rPr lang="en-CA" sz="3600" dirty="0"/>
+              <a:t>Quaternions are handled the same way</a:t>
+            </a:r>
+          </a:p>
+        </p:txBody>
+      </p:sp>
+      <p:sp>
+        <p:nvSpPr>
+          <p:cNvPr id="3" name="Content Placeholder 2">
+            <a:extLst>
+              <a:ext uri="{FF2B5EF4-FFF2-40B4-BE49-F238E27FC236}">
+                <a16:creationId xmlns:a16="http://schemas.microsoft.com/office/drawing/2014/main" id="{10EEAFCB-795E-A3CB-6D5F-1EA09E1C3F82}"/>
+              </a:ext>
+            </a:extLst>
+          </p:cNvPr>
+          <p:cNvSpPr>
+            <a:spLocks noGrp="1"/>
+          </p:cNvSpPr>
+          <p:nvPr>
+            <p:ph idx="1"/>
+          </p:nvPr>
+        </p:nvSpPr>
+        <p:spPr>
+          <a:xfrm>
+            <a:off x="653143" y="1669371"/>
+            <a:ext cx="11136086" cy="4351338"/>
+          </a:xfrm>
+        </p:spPr>
+        <p:txBody>
+          <a:bodyPr/>
+          <a:lstStyle/>
+          <a:p>
+            <a:r>
+              <a:rPr lang="en-CA" dirty="0"/>
+              <a:t>Like matrices, there is a type of “identity” quaternion</a:t>
+            </a:r>
+          </a:p>
+          <a:p>
+            <a:r>
+              <a:rPr lang="en-CA" dirty="0" err="1"/>
+              <a:t>glm</a:t>
+            </a:r>
+            <a:r>
+              <a:rPr lang="en-CA" dirty="0"/>
+              <a:t>::quat </a:t>
+            </a:r>
+            <a:r>
+              <a:rPr lang="en-CA" dirty="0" err="1"/>
+              <a:t>qOrientation</a:t>
+            </a:r>
+            <a:r>
+              <a:rPr lang="en-CA" dirty="0"/>
+              <a:t> = </a:t>
+            </a:r>
+            <a:r>
+              <a:rPr lang="en-CA" dirty="0" err="1"/>
+              <a:t>glm</a:t>
+            </a:r>
+            <a:r>
+              <a:rPr lang="en-CA" dirty="0"/>
+              <a:t>::quat(1.0f)</a:t>
+            </a:r>
+          </a:p>
+          <a:p>
+            <a:r>
+              <a:rPr lang="en-CA" dirty="0"/>
+              <a:t>Adjust this, say -37 degrees in the z:</a:t>
+            </a:r>
+          </a:p>
+          <a:p>
+            <a:r>
+              <a:rPr lang="en-CA" dirty="0" err="1"/>
+              <a:t>glm</a:t>
+            </a:r>
+            <a:r>
+              <a:rPr lang="en-CA" dirty="0"/>
+              <a:t>::quat </a:t>
+            </a:r>
+            <a:r>
+              <a:rPr lang="en-CA" b="1" dirty="0" err="1"/>
+              <a:t>qAdjustment</a:t>
+            </a:r>
+            <a:r>
+              <a:rPr lang="en-CA" dirty="0"/>
+              <a:t> = </a:t>
+            </a:r>
+            <a:r>
+              <a:rPr lang="en-CA" dirty="0" err="1"/>
+              <a:t>glm</a:t>
+            </a:r>
+            <a:r>
+              <a:rPr lang="en-CA" dirty="0"/>
+              <a:t>::quat( </a:t>
+            </a:r>
+            <a:r>
+              <a:rPr lang="en-CA" b="1" dirty="0"/>
+              <a:t>vec3(0.0, 0.0, -37.0f</a:t>
+            </a:r>
+            <a:r>
+              <a:rPr lang="en-CA" dirty="0"/>
+              <a:t>) );</a:t>
+            </a:r>
+          </a:p>
+          <a:p>
+            <a:r>
+              <a:rPr lang="en-CA" dirty="0"/>
+              <a:t>Updating the quaternion through multiplication:</a:t>
+            </a:r>
+          </a:p>
+          <a:p>
+            <a:r>
+              <a:rPr lang="en-CA" dirty="0" err="1"/>
+              <a:t>qOrientation</a:t>
+            </a:r>
+            <a:r>
+              <a:rPr lang="en-CA" dirty="0"/>
+              <a:t> *= </a:t>
+            </a:r>
+            <a:r>
+              <a:rPr lang="en-CA" b="1" dirty="0" err="1"/>
+              <a:t>qAdjustment</a:t>
+            </a:r>
+            <a:endParaRPr lang="en-CA" dirty="0"/>
+          </a:p>
+          <a:p>
+            <a:endParaRPr lang="en-CA" dirty="0"/>
+          </a:p>
+        </p:txBody>
+      </p:sp>
+    </p:spTree>
+    <p:extLst>
+      <p:ext uri="{BB962C8B-B14F-4D97-AF65-F5344CB8AC3E}">
+        <p14:creationId xmlns:p14="http://schemas.microsoft.com/office/powerpoint/2010/main" val="307279726"/>
+      </p:ext>
+    </p:extLst>
+  </p:cSld>
+  <p:clrMapOvr>
+    <a:masterClrMapping/>
+  </p:clrMapOvr>
+</p:sld>
+</file>
+
+<file path=ppt/slides/slide15.xml><?xml version="1.0" encoding="utf-8"?>
+<p:sld xmlns:a="http://schemas.openxmlformats.org/drawingml/2006/main" xmlns:r="http://schemas.openxmlformats.org/officeDocument/2006/relationships" xmlns:p="http://schemas.openxmlformats.org/presentationml/2006/main">
+  <p:cSld>
+    <p:spTree>
+      <p:nvGrpSpPr>
+        <p:cNvPr id="1" name=""/>
+        <p:cNvGrpSpPr/>
+        <p:nvPr/>
+      </p:nvGrpSpPr>
+      <p:grpSpPr>
+        <a:xfrm>
+          <a:off x="0" y="0"/>
+          <a:ext cx="0" cy="0"/>
+          <a:chOff x="0" y="0"/>
+          <a:chExt cx="0" cy="0"/>
+        </a:xfrm>
+      </p:grpSpPr>
+      <p:sp>
+        <p:nvSpPr>
+          <p:cNvPr id="2" name="Title 1">
+            <a:extLst>
+              <a:ext uri="{FF2B5EF4-FFF2-40B4-BE49-F238E27FC236}">
+                <a16:creationId xmlns:a16="http://schemas.microsoft.com/office/drawing/2014/main" id="{D909A6C9-E2B6-7D2E-5944-79DA9D1BA7E9}"/>
+              </a:ext>
+            </a:extLst>
+          </p:cNvPr>
+          <p:cNvSpPr>
+            <a:spLocks noGrp="1"/>
+          </p:cNvSpPr>
+          <p:nvPr>
+            <p:ph type="title"/>
+          </p:nvPr>
+        </p:nvSpPr>
+        <p:spPr>
+          <a:xfrm>
+            <a:off x="489857" y="365125"/>
+            <a:ext cx="10863943" cy="1325563"/>
+          </a:xfrm>
+        </p:spPr>
+        <p:txBody>
+          <a:bodyPr>
+            <a:normAutofit/>
+          </a:bodyPr>
+          <a:lstStyle/>
+          <a:p>
+            <a:r>
+              <a:rPr lang="en-CA" sz="3600" dirty="0"/>
+              <a:t>Quaternions are handled the same way</a:t>
+            </a:r>
+          </a:p>
+        </p:txBody>
+      </p:sp>
+      <p:sp>
+        <p:nvSpPr>
+          <p:cNvPr id="3" name="Content Placeholder 2">
+            <a:extLst>
+              <a:ext uri="{FF2B5EF4-FFF2-40B4-BE49-F238E27FC236}">
+                <a16:creationId xmlns:a16="http://schemas.microsoft.com/office/drawing/2014/main" id="{10EEAFCB-795E-A3CB-6D5F-1EA09E1C3F82}"/>
+              </a:ext>
+            </a:extLst>
+          </p:cNvPr>
+          <p:cNvSpPr>
+            <a:spLocks noGrp="1"/>
+          </p:cNvSpPr>
+          <p:nvPr>
+            <p:ph idx="1"/>
+          </p:nvPr>
+        </p:nvSpPr>
+        <p:spPr>
+          <a:xfrm>
+            <a:off x="653143" y="1669371"/>
+            <a:ext cx="11136086" cy="4351338"/>
+          </a:xfrm>
+        </p:spPr>
+        <p:txBody>
+          <a:bodyPr/>
+          <a:lstStyle/>
+          <a:p>
+            <a:r>
+              <a:rPr lang="en-CA" dirty="0" err="1"/>
+              <a:t>glm</a:t>
+            </a:r>
+            <a:r>
+              <a:rPr lang="en-CA" dirty="0"/>
+              <a:t>::quat </a:t>
+            </a:r>
+            <a:r>
+              <a:rPr lang="en-CA" dirty="0" err="1"/>
+              <a:t>qOrientation</a:t>
+            </a:r>
+            <a:r>
+              <a:rPr lang="en-CA" dirty="0"/>
+              <a:t> = </a:t>
+            </a:r>
+            <a:r>
+              <a:rPr lang="en-CA" dirty="0" err="1"/>
+              <a:t>glm</a:t>
+            </a:r>
+            <a:r>
+              <a:rPr lang="en-CA" dirty="0"/>
+              <a:t>::quat(1.0f)		// Euler 0, 0, 0</a:t>
+            </a:r>
+          </a:p>
+          <a:p>
+            <a:r>
+              <a:rPr lang="en-CA" dirty="0"/>
+              <a:t>Adjust this, say -1 degrees in the z:</a:t>
+            </a:r>
+          </a:p>
+          <a:p>
+            <a:r>
+              <a:rPr lang="en-CA" dirty="0" err="1"/>
+              <a:t>glm</a:t>
+            </a:r>
+            <a:r>
+              <a:rPr lang="en-CA" dirty="0"/>
+              <a:t>::quat </a:t>
+            </a:r>
+            <a:r>
+              <a:rPr lang="en-CA" b="1" dirty="0" err="1"/>
+              <a:t>qAdjustment</a:t>
+            </a:r>
+            <a:r>
+              <a:rPr lang="en-CA" dirty="0"/>
+              <a:t> = </a:t>
+            </a:r>
+            <a:r>
+              <a:rPr lang="en-CA" dirty="0" err="1"/>
+              <a:t>glm</a:t>
+            </a:r>
+            <a:r>
+              <a:rPr lang="en-CA" dirty="0"/>
+              <a:t>::quat( vec3(</a:t>
+            </a:r>
+            <a:r>
+              <a:rPr lang="en-CA" b="1" dirty="0"/>
+              <a:t>0.0, 0.0, -1.0f</a:t>
+            </a:r>
+            <a:r>
+              <a:rPr lang="en-CA" dirty="0"/>
+              <a:t>) );</a:t>
+            </a:r>
+          </a:p>
+          <a:p>
+            <a:r>
+              <a:rPr lang="en-CA" dirty="0"/>
+              <a:t>Updating the quaternion through multiplication:</a:t>
+            </a:r>
+          </a:p>
+          <a:p>
+            <a:r>
+              <a:rPr lang="en-CA" dirty="0" err="1"/>
+              <a:t>qOrientation</a:t>
+            </a:r>
+            <a:r>
+              <a:rPr lang="en-CA" dirty="0"/>
+              <a:t> *= </a:t>
+            </a:r>
+            <a:r>
+              <a:rPr lang="en-CA" b="1" dirty="0" err="1"/>
+              <a:t>qAdjustment</a:t>
+            </a:r>
+            <a:r>
+              <a:rPr lang="en-CA" dirty="0"/>
+              <a:t>	</a:t>
+            </a:r>
+            <a:r>
+              <a:rPr lang="en-CA" dirty="0">
+                <a:sym typeface="Wingdings" panose="05000000000000000000" pitchFamily="2" charset="2"/>
+              </a:rPr>
+              <a:t> -1 degrees around z</a:t>
+            </a:r>
+          </a:p>
+          <a:p>
+            <a:r>
+              <a:rPr lang="en-CA" dirty="0" err="1"/>
+              <a:t>qOrientation</a:t>
+            </a:r>
+            <a:r>
+              <a:rPr lang="en-CA" dirty="0"/>
+              <a:t> *= </a:t>
+            </a:r>
+            <a:r>
+              <a:rPr lang="en-CA" b="1" dirty="0" err="1"/>
+              <a:t>qAdjustment</a:t>
+            </a:r>
+            <a:r>
+              <a:rPr lang="en-CA" dirty="0"/>
+              <a:t>	</a:t>
+            </a:r>
+            <a:r>
+              <a:rPr lang="en-CA" dirty="0">
+                <a:sym typeface="Wingdings" panose="05000000000000000000" pitchFamily="2" charset="2"/>
+              </a:rPr>
+              <a:t> -2 degrees around z</a:t>
+            </a:r>
+          </a:p>
+          <a:p>
+            <a:r>
+              <a:rPr lang="en-CA" dirty="0" err="1"/>
+              <a:t>qOrientation</a:t>
+            </a:r>
+            <a:r>
+              <a:rPr lang="en-CA" dirty="0"/>
+              <a:t> *= </a:t>
+            </a:r>
+            <a:r>
+              <a:rPr lang="en-CA" b="1" dirty="0" err="1"/>
+              <a:t>qAdjustment</a:t>
+            </a:r>
+            <a:r>
+              <a:rPr lang="en-CA" dirty="0"/>
+              <a:t>	</a:t>
+            </a:r>
+            <a:r>
+              <a:rPr lang="en-CA" dirty="0">
+                <a:sym typeface="Wingdings" panose="05000000000000000000" pitchFamily="2" charset="2"/>
+              </a:rPr>
+              <a:t> -3 degrees around z</a:t>
+            </a:r>
+            <a:endParaRPr lang="en-CA" dirty="0"/>
+          </a:p>
+          <a:p>
+            <a:endParaRPr lang="en-CA" dirty="0"/>
+          </a:p>
+          <a:p>
+            <a:endParaRPr lang="en-CA" dirty="0"/>
+          </a:p>
+          <a:p>
+            <a:endParaRPr lang="en-CA" dirty="0"/>
+          </a:p>
+        </p:txBody>
+      </p:sp>
+    </p:spTree>
+    <p:extLst>
+      <p:ext uri="{BB962C8B-B14F-4D97-AF65-F5344CB8AC3E}">
+        <p14:creationId xmlns:p14="http://schemas.microsoft.com/office/powerpoint/2010/main" val="2642662493"/>
+      </p:ext>
+    </p:extLst>
+  </p:cSld>
+  <p:clrMapOvr>
+    <a:masterClrMapping/>
+  </p:clrMapOvr>
+</p:sld>
+</file>
+
+<file path=ppt/slides/slide16.xml><?xml version="1.0" encoding="utf-8"?>
+<p:sld xmlns:a="http://schemas.openxmlformats.org/drawingml/2006/main" xmlns:r="http://schemas.openxmlformats.org/officeDocument/2006/relationships" xmlns:p="http://schemas.openxmlformats.org/presentationml/2006/main">
+  <p:cSld>
+    <p:spTree>
+      <p:nvGrpSpPr>
+        <p:cNvPr id="1" name=""/>
+        <p:cNvGrpSpPr/>
+        <p:nvPr/>
+      </p:nvGrpSpPr>
+      <p:grpSpPr>
+        <a:xfrm>
+          <a:off x="0" y="0"/>
+          <a:ext cx="0" cy="0"/>
+          <a:chOff x="0" y="0"/>
+          <a:chExt cx="0" cy="0"/>
+        </a:xfrm>
+      </p:grpSpPr>
+      <p:sp>
+        <p:nvSpPr>
+          <p:cNvPr id="2" name="Title 1">
+            <a:extLst>
+              <a:ext uri="{FF2B5EF4-FFF2-40B4-BE49-F238E27FC236}">
+                <a16:creationId xmlns:a16="http://schemas.microsoft.com/office/drawing/2014/main" id="{D909A6C9-E2B6-7D2E-5944-79DA9D1BA7E9}"/>
+              </a:ext>
+            </a:extLst>
+          </p:cNvPr>
+          <p:cNvSpPr>
+            <a:spLocks noGrp="1"/>
+          </p:cNvSpPr>
+          <p:nvPr>
+            <p:ph type="title"/>
+          </p:nvPr>
+        </p:nvSpPr>
+        <p:spPr>
+          <a:xfrm>
+            <a:off x="489857" y="365125"/>
+            <a:ext cx="10863943" cy="1325563"/>
+          </a:xfrm>
+        </p:spPr>
+        <p:txBody>
+          <a:bodyPr>
+            <a:normAutofit/>
+          </a:bodyPr>
+          <a:lstStyle/>
+          <a:p>
+            <a:r>
+              <a:rPr lang="en-CA" sz="3600" dirty="0"/>
               <a:t>Quaternions: WARNING!</a:t>
             </a:r>
           </a:p>
@@ -4472,7 +4837,7 @@
 </p:sld>
 </file>
 
-<file path=ppt/slides/slide15.xml><?xml version="1.0" encoding="utf-8"?>
+<file path=ppt/slides/slide17.xml><?xml version="1.0" encoding="utf-8"?>
 <p:sld xmlns:a="http://schemas.openxmlformats.org/drawingml/2006/main" xmlns:r="http://schemas.openxmlformats.org/officeDocument/2006/relationships" xmlns:p="http://schemas.openxmlformats.org/presentationml/2006/main">
   <p:cSld>
     <p:spTree>
@@ -4859,7 +5224,7 @@
 </p:sld>
 </file>
 
-<file path=ppt/slides/slide16.xml><?xml version="1.0" encoding="utf-8"?>
+<file path=ppt/slides/slide18.xml><?xml version="1.0" encoding="utf-8"?>
 <p:sld xmlns:a="http://schemas.openxmlformats.org/drawingml/2006/main" xmlns:r="http://schemas.openxmlformats.org/officeDocument/2006/relationships" xmlns:p="http://schemas.openxmlformats.org/presentationml/2006/main">
   <p:cSld>
     <p:spTree>
@@ -6339,7 +6704,7 @@
           <a:p>
             <a:r>
               <a:rPr lang="en-CA" sz="3600" dirty="0"/>
-              <a:t>Quaternion angle representation</a:t>
+              <a:t>Forward kinematic</a:t>
             </a:r>
           </a:p>
         </p:txBody>
@@ -6362,8 +6727,8 @@
         </p:nvSpPr>
         <p:spPr>
           <a:xfrm>
-            <a:off x="566057" y="1690688"/>
-            <a:ext cx="11136086" cy="4351338"/>
+            <a:off x="285135" y="1690688"/>
+            <a:ext cx="6400800" cy="4351338"/>
           </a:xfrm>
         </p:spPr>
         <p:txBody>
@@ -6372,40 +6737,166 @@
           <a:p>
             <a:r>
               <a:rPr lang="en-CA" dirty="0"/>
-              <a:t>We’ve been using Euler angles</a:t>
-            </a:r>
-          </a:p>
-          <a:p>
-            <a:pPr lvl="1"/>
-            <a:r>
-              <a:rPr lang="en-CA" dirty="0"/>
-              <a:t>Rotation around x and y and z</a:t>
-            </a:r>
-          </a:p>
-          <a:p>
-            <a:r>
-              <a:rPr lang="en-CA" dirty="0"/>
-              <a:t>Potential issue is that are transformations are rotating the WORLD, so when we apply a rotation that’s large, worst case 90 degrees, 180 degree, we effectively “lose” one axis</a:t>
-            </a:r>
-          </a:p>
-          <a:p>
-            <a:r>
-              <a:rPr lang="en-CA" dirty="0"/>
-              <a:t>Quaternions can be treated like matrix values.</a:t>
-            </a:r>
-          </a:p>
-          <a:p>
-            <a:r>
-              <a:rPr lang="en-CA" dirty="0"/>
-              <a:t>Consider: you don’t store translation, rotation, and scale separately, instead you store them all together in a single mat4.</a:t>
-            </a:r>
+              <a:t>This is where we find a location of some end point based on the post or angle/whatever of a model</a:t>
+            </a:r>
+          </a:p>
+          <a:p>
+            <a:r>
+              <a:rPr lang="en-CA" dirty="0"/>
+              <a:t>Basic idea is that while you traverse through the hierarchy of matrix values for the scene graph/bones, you keep track of the final matrix or location of the final object. </a:t>
+            </a:r>
+          </a:p>
+          <a:p>
+            <a:r>
+              <a:rPr lang="en-CA" dirty="0"/>
+              <a:t>You may have to add another “bone”/transform to reach the actual point you want.</a:t>
+            </a:r>
+          </a:p>
+        </p:txBody>
+      </p:sp>
+      <p:pic>
+        <p:nvPicPr>
+          <p:cNvPr id="1026" name="Picture 2">
+            <a:extLst>
+              <a:ext uri="{FF2B5EF4-FFF2-40B4-BE49-F238E27FC236}">
+                <a16:creationId xmlns:a16="http://schemas.microsoft.com/office/drawing/2014/main" id="{E5877545-6F1A-6DA9-14CD-9C8F6A04BAAC}"/>
+              </a:ext>
+            </a:extLst>
+          </p:cNvPr>
+          <p:cNvPicPr>
+            <a:picLocks noChangeAspect="1" noChangeArrowheads="1"/>
+          </p:cNvPicPr>
+          <p:nvPr/>
+        </p:nvPicPr>
+        <p:blipFill>
+          <a:blip r:embed="rId2">
+            <a:extLst>
+              <a:ext uri="{28A0092B-C50C-407E-A947-70E740481C1C}">
+                <a14:useLocalDpi xmlns:a14="http://schemas.microsoft.com/office/drawing/2010/main" val="0"/>
+              </a:ext>
+            </a:extLst>
+          </a:blip>
+          <a:srcRect/>
+          <a:stretch>
+            <a:fillRect/>
+          </a:stretch>
+        </p:blipFill>
+        <p:spPr bwMode="auto">
+          <a:xfrm>
+            <a:off x="7030371" y="185554"/>
+            <a:ext cx="4876494" cy="6307321"/>
+          </a:xfrm>
+          <a:prstGeom prst="rect">
+            <a:avLst/>
+          </a:prstGeom>
+          <a:noFill/>
+          <a:extLst>
+            <a:ext uri="{909E8E84-426E-40DD-AFC4-6F175D3DCCD1}">
+              <a14:hiddenFill xmlns:a14="http://schemas.microsoft.com/office/drawing/2010/main">
+                <a:solidFill>
+                  <a:srgbClr val="FFFFFF"/>
+                </a:solidFill>
+              </a14:hiddenFill>
+            </a:ext>
+          </a:extLst>
+        </p:spPr>
+      </p:pic>
+      <p:sp>
+        <p:nvSpPr>
+          <p:cNvPr id="4" name="Oval 3">
+            <a:extLst>
+              <a:ext uri="{FF2B5EF4-FFF2-40B4-BE49-F238E27FC236}">
+                <a16:creationId xmlns:a16="http://schemas.microsoft.com/office/drawing/2014/main" id="{2198E2DE-479A-C472-1F09-0BEF45D7735E}"/>
+              </a:ext>
+            </a:extLst>
+          </p:cNvPr>
+          <p:cNvSpPr/>
+          <p:nvPr/>
+        </p:nvSpPr>
+        <p:spPr>
+          <a:xfrm>
+            <a:off x="9851921" y="3546987"/>
+            <a:ext cx="496625" cy="395748"/>
+          </a:xfrm>
+          <a:prstGeom prst="ellipse">
+            <a:avLst/>
+          </a:prstGeom>
+        </p:spPr>
+        <p:style>
+          <a:lnRef idx="2">
+            <a:schemeClr val="accent1">
+              <a:shade val="15000"/>
+            </a:schemeClr>
+          </a:lnRef>
+          <a:fillRef idx="1">
+            <a:schemeClr val="accent1"/>
+          </a:fillRef>
+          <a:effectRef idx="0">
+            <a:schemeClr val="accent1"/>
+          </a:effectRef>
+          <a:fontRef idx="minor">
+            <a:schemeClr val="lt1"/>
+          </a:fontRef>
+        </p:style>
+        <p:txBody>
+          <a:bodyPr rtlCol="0" anchor="ctr"/>
+          <a:lstStyle/>
+          <a:p>
+            <a:pPr algn="ctr"/>
+            <a:endParaRPr lang="en-CA"/>
+          </a:p>
+        </p:txBody>
+      </p:sp>
+      <p:sp>
+        <p:nvSpPr>
+          <p:cNvPr id="5" name="Arrow: Right 4">
+            <a:extLst>
+              <a:ext uri="{FF2B5EF4-FFF2-40B4-BE49-F238E27FC236}">
+                <a16:creationId xmlns:a16="http://schemas.microsoft.com/office/drawing/2014/main" id="{A9DDD880-19D4-325D-A6BE-15340769687E}"/>
+              </a:ext>
+            </a:extLst>
+          </p:cNvPr>
+          <p:cNvSpPr/>
+          <p:nvPr/>
+        </p:nvSpPr>
+        <p:spPr>
+          <a:xfrm rot="20097724">
+            <a:off x="6329410" y="4319398"/>
+            <a:ext cx="3604782" cy="521110"/>
+          </a:xfrm>
+          <a:prstGeom prst="rightArrow">
+            <a:avLst/>
+          </a:prstGeom>
+        </p:spPr>
+        <p:style>
+          <a:lnRef idx="2">
+            <a:schemeClr val="accent1">
+              <a:shade val="15000"/>
+            </a:schemeClr>
+          </a:lnRef>
+          <a:fillRef idx="1">
+            <a:schemeClr val="accent1"/>
+          </a:fillRef>
+          <a:effectRef idx="0">
+            <a:schemeClr val="accent1"/>
+          </a:effectRef>
+          <a:fontRef idx="minor">
+            <a:schemeClr val="lt1"/>
+          </a:fontRef>
+        </p:style>
+        <p:txBody>
+          <a:bodyPr rtlCol="0" anchor="ctr"/>
+          <a:lstStyle/>
+          <a:p>
+            <a:pPr algn="ctr"/>
+            <a:endParaRPr lang="en-CA"/>
           </a:p>
         </p:txBody>
       </p:sp>
     </p:spTree>
     <p:extLst>
       <p:ext uri="{BB962C8B-B14F-4D97-AF65-F5344CB8AC3E}">
-        <p14:creationId xmlns:p14="http://schemas.microsoft.com/office/powerpoint/2010/main" val="3123853637"/>
+        <p14:creationId xmlns:p14="http://schemas.microsoft.com/office/powerpoint/2010/main" val="762043021"/>
       </p:ext>
     </p:extLst>
   </p:cSld>
@@ -6462,7 +6953,7 @@
           <a:p>
             <a:r>
               <a:rPr lang="en-CA" sz="3600" dirty="0"/>
-              <a:t>Hypothetical using mat4 instead of translation</a:t>
+              <a:t>Inverse kinematics</a:t>
             </a:r>
           </a:p>
         </p:txBody>
@@ -6485,8 +6976,8 @@
         </p:nvSpPr>
         <p:spPr>
           <a:xfrm>
-            <a:off x="566057" y="1690688"/>
-            <a:ext cx="11136086" cy="4351338"/>
+            <a:off x="285135" y="1690688"/>
+            <a:ext cx="6351639" cy="4208667"/>
           </a:xfrm>
         </p:spPr>
         <p:txBody>
@@ -6495,100 +6986,166 @@
           <a:p>
             <a:r>
               <a:rPr lang="en-CA" dirty="0"/>
-              <a:t>Up to now: </a:t>
-            </a:r>
-          </a:p>
-          <a:p>
-            <a:pPr lvl="1"/>
-            <a:r>
-              <a:rPr lang="en-CA" dirty="0"/>
-              <a:t>Store position as a vec3 (</a:t>
-            </a:r>
-            <a:r>
-              <a:rPr lang="en-CA" dirty="0" err="1"/>
-              <a:t>xyz</a:t>
-            </a:r>
-            <a:r>
-              <a:rPr lang="en-CA" dirty="0"/>
-              <a:t>)</a:t>
-            </a:r>
-          </a:p>
-          <a:p>
-            <a:pPr lvl="1"/>
-            <a:r>
-              <a:rPr lang="en-CA" dirty="0"/>
-              <a:t>Now we store it as a mat4</a:t>
-            </a:r>
-          </a:p>
-          <a:p>
-            <a:r>
-              <a:rPr lang="en-CA" dirty="0"/>
-              <a:t>“You place the object at 4, -17, 0”</a:t>
-            </a:r>
-          </a:p>
-          <a:p>
-            <a:pPr lvl="1"/>
-            <a:r>
-              <a:rPr lang="en-CA" dirty="0"/>
-              <a:t>Create a matrix that translated to (4, -17, 0)</a:t>
-            </a:r>
-          </a:p>
-          <a:p>
-            <a:pPr lvl="1"/>
-            <a:r>
-              <a:rPr lang="en-CA" dirty="0"/>
-              <a:t>mat4 </a:t>
-            </a:r>
-            <a:r>
-              <a:rPr lang="en-CA" dirty="0" err="1"/>
-              <a:t>matTrans</a:t>
-            </a:r>
-            <a:r>
-              <a:rPr lang="en-CA" dirty="0"/>
-              <a:t> = translate( 4, -17, 0 );</a:t>
-            </a:r>
-          </a:p>
-          <a:p>
-            <a:r>
-              <a:rPr lang="en-CA" dirty="0"/>
-              <a:t>At the render call, you’d apply this </a:t>
-            </a:r>
-            <a:r>
-              <a:rPr lang="en-CA" i="1" dirty="0"/>
-              <a:t>matrix </a:t>
-            </a:r>
-            <a:r>
-              <a:rPr lang="en-CA" dirty="0"/>
-              <a:t>not the </a:t>
-            </a:r>
-            <a:r>
-              <a:rPr lang="en-CA" dirty="0" err="1"/>
-              <a:t>xyz</a:t>
-            </a:r>
-            <a:endParaRPr lang="en-CA" dirty="0"/>
-          </a:p>
-          <a:p>
-            <a:pPr lvl="1"/>
-            <a:r>
-              <a:rPr lang="en-CA" dirty="0" err="1"/>
-              <a:t>matModel</a:t>
-            </a:r>
-            <a:r>
-              <a:rPr lang="en-CA" dirty="0"/>
-              <a:t> *= </a:t>
-            </a:r>
-            <a:r>
-              <a:rPr lang="en-CA" dirty="0" err="1"/>
-              <a:t>matTrans</a:t>
-            </a:r>
-            <a:endParaRPr lang="en-CA" dirty="0"/>
+              <a:t>This is sort of the opposite of FK (forward kinematics) but nightmarishly more difficult. </a:t>
+            </a:r>
+          </a:p>
+          <a:p>
+            <a:r>
+              <a:rPr lang="en-CA" dirty="0"/>
+              <a:t>You are giving a final position of the end point (blue ball) and coming up with a plausible angle of ALL the joints/bones for the. </a:t>
+            </a:r>
+          </a:p>
+          <a:p>
+            <a:r>
+              <a:rPr lang="en-CA" dirty="0"/>
+              <a:t>…and there are literally infinite possible poses for that.</a:t>
+            </a:r>
+          </a:p>
+        </p:txBody>
+      </p:sp>
+      <p:pic>
+        <p:nvPicPr>
+          <p:cNvPr id="1026" name="Picture 2">
+            <a:extLst>
+              <a:ext uri="{FF2B5EF4-FFF2-40B4-BE49-F238E27FC236}">
+                <a16:creationId xmlns:a16="http://schemas.microsoft.com/office/drawing/2014/main" id="{E5877545-6F1A-6DA9-14CD-9C8F6A04BAAC}"/>
+              </a:ext>
+            </a:extLst>
+          </p:cNvPr>
+          <p:cNvPicPr>
+            <a:picLocks noChangeAspect="1" noChangeArrowheads="1"/>
+          </p:cNvPicPr>
+          <p:nvPr/>
+        </p:nvPicPr>
+        <p:blipFill>
+          <a:blip r:embed="rId2">
+            <a:extLst>
+              <a:ext uri="{28A0092B-C50C-407E-A947-70E740481C1C}">
+                <a14:useLocalDpi xmlns:a14="http://schemas.microsoft.com/office/drawing/2010/main" val="0"/>
+              </a:ext>
+            </a:extLst>
+          </a:blip>
+          <a:srcRect/>
+          <a:stretch>
+            <a:fillRect/>
+          </a:stretch>
+        </p:blipFill>
+        <p:spPr bwMode="auto">
+          <a:xfrm>
+            <a:off x="7030371" y="185554"/>
+            <a:ext cx="4876494" cy="6307321"/>
+          </a:xfrm>
+          <a:prstGeom prst="rect">
+            <a:avLst/>
+          </a:prstGeom>
+          <a:noFill/>
+          <a:extLst>
+            <a:ext uri="{909E8E84-426E-40DD-AFC4-6F175D3DCCD1}">
+              <a14:hiddenFill xmlns:a14="http://schemas.microsoft.com/office/drawing/2010/main">
+                <a:solidFill>
+                  <a:srgbClr val="FFFFFF"/>
+                </a:solidFill>
+              </a14:hiddenFill>
+            </a:ext>
+          </a:extLst>
+        </p:spPr>
+      </p:pic>
+      <p:sp>
+        <p:nvSpPr>
+          <p:cNvPr id="4" name="Oval 3">
+            <a:extLst>
+              <a:ext uri="{FF2B5EF4-FFF2-40B4-BE49-F238E27FC236}">
+                <a16:creationId xmlns:a16="http://schemas.microsoft.com/office/drawing/2014/main" id="{2198E2DE-479A-C472-1F09-0BEF45D7735E}"/>
+              </a:ext>
+            </a:extLst>
+          </p:cNvPr>
+          <p:cNvSpPr/>
+          <p:nvPr/>
+        </p:nvSpPr>
+        <p:spPr>
+          <a:xfrm>
+            <a:off x="9851921" y="3546987"/>
+            <a:ext cx="496625" cy="395748"/>
+          </a:xfrm>
+          <a:prstGeom prst="ellipse">
+            <a:avLst/>
+          </a:prstGeom>
+        </p:spPr>
+        <p:style>
+          <a:lnRef idx="2">
+            <a:schemeClr val="accent1">
+              <a:shade val="15000"/>
+            </a:schemeClr>
+          </a:lnRef>
+          <a:fillRef idx="1">
+            <a:schemeClr val="accent1"/>
+          </a:fillRef>
+          <a:effectRef idx="0">
+            <a:schemeClr val="accent1"/>
+          </a:effectRef>
+          <a:fontRef idx="minor">
+            <a:schemeClr val="lt1"/>
+          </a:fontRef>
+        </p:style>
+        <p:txBody>
+          <a:bodyPr rtlCol="0" anchor="ctr"/>
+          <a:lstStyle/>
+          <a:p>
+            <a:pPr algn="ctr"/>
+            <a:endParaRPr lang="en-CA"/>
+          </a:p>
+        </p:txBody>
+      </p:sp>
+      <p:sp>
+        <p:nvSpPr>
+          <p:cNvPr id="6" name="Oval 5">
+            <a:extLst>
+              <a:ext uri="{FF2B5EF4-FFF2-40B4-BE49-F238E27FC236}">
+                <a16:creationId xmlns:a16="http://schemas.microsoft.com/office/drawing/2014/main" id="{A27310D6-2C41-F182-7BC0-2EF55F04B6D1}"/>
+              </a:ext>
+            </a:extLst>
+          </p:cNvPr>
+          <p:cNvSpPr/>
+          <p:nvPr/>
+        </p:nvSpPr>
+        <p:spPr>
+          <a:xfrm>
+            <a:off x="7914966" y="1870259"/>
+            <a:ext cx="496625" cy="395748"/>
+          </a:xfrm>
+          <a:prstGeom prst="ellipse">
+            <a:avLst/>
+          </a:prstGeom>
+        </p:spPr>
+        <p:style>
+          <a:lnRef idx="2">
+            <a:schemeClr val="accent1">
+              <a:shade val="15000"/>
+            </a:schemeClr>
+          </a:lnRef>
+          <a:fillRef idx="1">
+            <a:schemeClr val="accent1"/>
+          </a:fillRef>
+          <a:effectRef idx="0">
+            <a:schemeClr val="accent1"/>
+          </a:effectRef>
+          <a:fontRef idx="minor">
+            <a:schemeClr val="lt1"/>
+          </a:fontRef>
+        </p:style>
+        <p:txBody>
+          <a:bodyPr rtlCol="0" anchor="ctr"/>
+          <a:lstStyle/>
+          <a:p>
+            <a:pPr algn="ctr"/>
+            <a:endParaRPr lang="en-CA"/>
           </a:p>
         </p:txBody>
       </p:sp>
     </p:spTree>
     <p:extLst>
       <p:ext uri="{BB962C8B-B14F-4D97-AF65-F5344CB8AC3E}">
-        <p14:creationId xmlns:p14="http://schemas.microsoft.com/office/powerpoint/2010/main" val="3343575348"/>
+        <p14:creationId xmlns:p14="http://schemas.microsoft.com/office/powerpoint/2010/main" val="587050547"/>
       </p:ext>
     </p:extLst>
   </p:cSld>
@@ -6645,7 +7202,7 @@
           <a:p>
             <a:r>
               <a:rPr lang="en-CA" sz="3600" dirty="0"/>
-              <a:t>Hypothetical using mat4 instead of translation</a:t>
+              <a:t>Quaternion angle representation</a:t>
             </a:r>
           </a:p>
         </p:txBody>
@@ -6678,75 +7235,32 @@
           <a:p>
             <a:r>
               <a:rPr lang="en-CA" dirty="0"/>
-              <a:t>Now consider you are moving it “a little bit”</a:t>
-            </a:r>
-          </a:p>
-          <a:p>
-            <a:r>
-              <a:rPr lang="en-CA" dirty="0"/>
-              <a:t>Press a key and it moves (0, +0.1, 0) </a:t>
+              <a:t>We’ve been using Euler angles</a:t>
             </a:r>
           </a:p>
           <a:p>
             <a:pPr lvl="1"/>
             <a:r>
               <a:rPr lang="en-CA" dirty="0"/>
-              <a:t>(+0.1 units in the y)</a:t>
-            </a:r>
-          </a:p>
-          <a:p>
-            <a:pPr lvl="1"/>
-            <a:r>
-              <a:rPr lang="en-CA" dirty="0"/>
-              <a:t>vec3 </a:t>
-            </a:r>
-            <a:r>
-              <a:rPr lang="en-CA" dirty="0" err="1"/>
-              <a:t>adjustmentXYZ</a:t>
-            </a:r>
-            <a:r>
-              <a:rPr lang="en-CA" dirty="0"/>
-              <a:t> = vec3(0, +0.1, 0)</a:t>
-            </a:r>
-          </a:p>
-          <a:p>
-            <a:r>
-              <a:rPr lang="en-CA" dirty="0"/>
-              <a:t>If you are storing position, you would add this to the current position:</a:t>
-            </a:r>
-          </a:p>
-          <a:p>
-            <a:pPr lvl="1"/>
-            <a:r>
-              <a:rPr lang="en-CA" dirty="0" err="1"/>
-              <a:t>PositionXYZ</a:t>
-            </a:r>
-            <a:r>
-              <a:rPr lang="en-CA" dirty="0"/>
-              <a:t> += </a:t>
-            </a:r>
-            <a:r>
-              <a:rPr lang="en-CA" dirty="0" err="1"/>
-              <a:t>adjustmentXYZ</a:t>
-            </a:r>
-            <a:endParaRPr lang="en-CA" dirty="0"/>
-          </a:p>
-          <a:p>
-            <a:pPr lvl="1"/>
-            <a:r>
-              <a:rPr lang="en-CA" dirty="0"/>
-              <a:t>Then use current position to calculate a model matrix</a:t>
-            </a:r>
-          </a:p>
-          <a:p>
-            <a:pPr lvl="1"/>
-            <a:r>
-              <a:rPr lang="en-CA" dirty="0" err="1"/>
-              <a:t>matModel</a:t>
-            </a:r>
-            <a:r>
-              <a:rPr lang="en-CA" dirty="0"/>
-              <a:t> = translate( Position)</a:t>
+              <a:t>Rotation around x and y and z</a:t>
+            </a:r>
+          </a:p>
+          <a:p>
+            <a:r>
+              <a:rPr lang="en-CA" dirty="0"/>
+              <a:t>Potential issue is that are transformations are rotating the WORLD, so when we apply a rotation that’s large, worst case 90 degrees, 180 degree, we effectively “lose” one axis</a:t>
+            </a:r>
+          </a:p>
+          <a:p>
+            <a:r>
+              <a:rPr lang="en-CA" dirty="0"/>
+              <a:t>Quaternions can be treated like matrix values.</a:t>
+            </a:r>
+          </a:p>
+          <a:p>
+            <a:r>
+              <a:rPr lang="en-CA" dirty="0"/>
+              <a:t>Consider: you don’t store translation, rotation, and scale separately, instead you store them all together in a single mat4.</a:t>
             </a:r>
           </a:p>
         </p:txBody>
@@ -6754,7 +7268,7 @@
     </p:spTree>
     <p:extLst>
       <p:ext uri="{BB962C8B-B14F-4D97-AF65-F5344CB8AC3E}">
-        <p14:creationId xmlns:p14="http://schemas.microsoft.com/office/powerpoint/2010/main" val="376123823"/>
+        <p14:creationId xmlns:p14="http://schemas.microsoft.com/office/powerpoint/2010/main" val="3123853637"/>
       </p:ext>
     </p:extLst>
   </p:cSld>
@@ -6844,86 +7358,77 @@
           <a:p>
             <a:r>
               <a:rPr lang="en-CA" dirty="0"/>
-              <a:t>Now consider you are moving it “a little bit”</a:t>
-            </a:r>
-          </a:p>
-          <a:p>
-            <a:r>
-              <a:rPr lang="en-CA" dirty="0"/>
-              <a:t>Press a key and it moves (0, +0.1, 0) </a:t>
+              <a:t>Up to now: </a:t>
             </a:r>
           </a:p>
           <a:p>
             <a:pPr lvl="1"/>
             <a:r>
               <a:rPr lang="en-CA" dirty="0"/>
-              <a:t>(+0.1 units in the y)</a:t>
+              <a:t>Store position as a vec3 (</a:t>
+            </a:r>
+            <a:r>
+              <a:rPr lang="en-CA" dirty="0" err="1"/>
+              <a:t>xyz</a:t>
+            </a:r>
+            <a:r>
+              <a:rPr lang="en-CA" dirty="0"/>
+              <a:t>)</a:t>
             </a:r>
           </a:p>
           <a:p>
             <a:pPr lvl="1"/>
             <a:r>
-              <a:rPr lang="en-CA" strike="dblStrike" dirty="0"/>
-              <a:t>vec3 </a:t>
-            </a:r>
-            <a:r>
-              <a:rPr lang="en-CA" strike="dblStrike" dirty="0" err="1"/>
-              <a:t>adjustmentXYZ</a:t>
-            </a:r>
-            <a:r>
-              <a:rPr lang="en-CA" strike="dblStrike" dirty="0"/>
-              <a:t> = vec3(0, +0.1, 0)</a:t>
+              <a:rPr lang="en-CA" dirty="0"/>
+              <a:t>Now we store it as a mat4</a:t>
+            </a:r>
+          </a:p>
+          <a:p>
+            <a:r>
+              <a:rPr lang="en-CA" dirty="0"/>
+              <a:t>“You place the object at 4, -17, 0”</a:t>
             </a:r>
           </a:p>
           <a:p>
             <a:pPr lvl="1"/>
             <a:r>
-              <a:rPr lang="en-CA" b="1" dirty="0" err="1"/>
-              <a:t>matAdjustmentXYZ</a:t>
-            </a:r>
-            <a:r>
-              <a:rPr lang="en-CA" dirty="0"/>
-              <a:t> = translate( vec3( 0, +0.1, 0 ) );</a:t>
-            </a:r>
-          </a:p>
-          <a:p>
-            <a:r>
-              <a:rPr lang="en-CA" dirty="0"/>
-              <a:t>Instead of adjusting the vec3 position:</a:t>
+              <a:rPr lang="en-CA" dirty="0"/>
+              <a:t>Create a matrix that translated to (4, -17, 0)</a:t>
             </a:r>
           </a:p>
           <a:p>
             <a:pPr lvl="1"/>
             <a:r>
-              <a:rPr lang="en-CA" strike="dblStrike" dirty="0" err="1"/>
-              <a:t>PositionXYZ</a:t>
-            </a:r>
-            <a:r>
-              <a:rPr lang="en-CA" strike="dblStrike" dirty="0"/>
-              <a:t> += </a:t>
-            </a:r>
-            <a:r>
-              <a:rPr lang="en-CA" strike="dblStrike" dirty="0" err="1"/>
-              <a:t>adjustmentXYZ</a:t>
-            </a:r>
-            <a:endParaRPr lang="en-CA" strike="dblStrike" dirty="0"/>
-          </a:p>
-          <a:p>
-            <a:pPr lvl="1"/>
-            <a:r>
-              <a:rPr lang="en-CA" strike="dblStrike" dirty="0" err="1"/>
-              <a:t>matModel</a:t>
-            </a:r>
-            <a:r>
-              <a:rPr lang="en-CA" strike="dblStrike" dirty="0"/>
-              <a:t> = translate( Position)</a:t>
-            </a:r>
-          </a:p>
-          <a:p>
-            <a:r>
-              <a:rPr lang="en-CA" dirty="0"/>
-              <a:t>You apply this directly to the model matrix:</a:t>
-            </a:r>
+              <a:rPr lang="en-CA" dirty="0"/>
+              <a:t>mat4 </a:t>
+            </a:r>
+            <a:r>
+              <a:rPr lang="en-CA" dirty="0" err="1"/>
+              <a:t>matTrans</a:t>
+            </a:r>
+            <a:r>
+              <a:rPr lang="en-CA" dirty="0"/>
+              <a:t> = translate( 4, -17, 0 );</a:t>
+            </a:r>
+          </a:p>
+          <a:p>
+            <a:r>
+              <a:rPr lang="en-CA" dirty="0"/>
+              <a:t>At the render call, you’d apply this </a:t>
+            </a:r>
+            <a:r>
+              <a:rPr lang="en-CA" i="1" dirty="0"/>
+              <a:t>matrix </a:t>
+            </a:r>
+            <a:r>
+              <a:rPr lang="en-CA" dirty="0"/>
+              <a:t>not the </a:t>
+            </a:r>
+            <a:r>
+              <a:rPr lang="en-CA" dirty="0" err="1"/>
+              <a:t>xyz</a:t>
+            </a:r>
+            <a:endParaRPr lang="en-CA" dirty="0"/>
           </a:p>
           <a:p>
             <a:pPr lvl="1"/>
@@ -6936,8 +7441,8 @@
               <a:t> *= </a:t>
             </a:r>
             <a:r>
-              <a:rPr lang="en-CA" b="1" dirty="0" err="1"/>
-              <a:t>matAdjustmentXYZ</a:t>
+              <a:rPr lang="en-CA" dirty="0" err="1"/>
+              <a:t>matTrans</a:t>
             </a:r>
             <a:endParaRPr lang="en-CA" dirty="0"/>
           </a:p>
@@ -6946,7 +7451,7 @@
     </p:spTree>
     <p:extLst>
       <p:ext uri="{BB962C8B-B14F-4D97-AF65-F5344CB8AC3E}">
-        <p14:creationId xmlns:p14="http://schemas.microsoft.com/office/powerpoint/2010/main" val="4033566807"/>
+        <p14:creationId xmlns:p14="http://schemas.microsoft.com/office/powerpoint/2010/main" val="3343575348"/>
       </p:ext>
     </p:extLst>
   </p:cSld>

</xml_diff>